<commit_message>
landing page added question and requests link
</commit_message>
<xml_diff>
--- a/images/vis.pptx
+++ b/images/vis.pptx
@@ -8,6 +8,7 @@
     <p:sldId id="256" r:id="rId2"/>
     <p:sldId id="257" r:id="rId3"/>
     <p:sldId id="258" r:id="rId4"/>
+    <p:sldId id="259" r:id="rId5"/>
   </p:sldIdLst>
   <p:sldSz cx="9144000" cy="6858000" type="screen4x3"/>
   <p:notesSz cx="6858000" cy="9144000"/>
@@ -291,7 +292,7 @@
             <a:fld id="{1D8BD707-D9CF-40AE-B4C6-C98DA3205C09}" type="datetimeFigureOut">
               <a:rPr lang="en-US" smtClean="0"/>
               <a:pPr/>
-              <a:t>3/13/2017</a:t>
+              <a:t>3/19/2017</a:t>
             </a:fld>
             <a:endParaRPr lang="en-US"/>
           </a:p>
@@ -458,7 +459,7 @@
             <a:fld id="{1D8BD707-D9CF-40AE-B4C6-C98DA3205C09}" type="datetimeFigureOut">
               <a:rPr lang="en-US" smtClean="0"/>
               <a:pPr/>
-              <a:t>3/13/2017</a:t>
+              <a:t>3/19/2017</a:t>
             </a:fld>
             <a:endParaRPr lang="en-US"/>
           </a:p>
@@ -635,7 +636,7 @@
             <a:fld id="{1D8BD707-D9CF-40AE-B4C6-C98DA3205C09}" type="datetimeFigureOut">
               <a:rPr lang="en-US" smtClean="0"/>
               <a:pPr/>
-              <a:t>3/13/2017</a:t>
+              <a:t>3/19/2017</a:t>
             </a:fld>
             <a:endParaRPr lang="en-US"/>
           </a:p>
@@ -802,7 +803,7 @@
             <a:fld id="{1D8BD707-D9CF-40AE-B4C6-C98DA3205C09}" type="datetimeFigureOut">
               <a:rPr lang="en-US" smtClean="0"/>
               <a:pPr/>
-              <a:t>3/13/2017</a:t>
+              <a:t>3/19/2017</a:t>
             </a:fld>
             <a:endParaRPr lang="en-US"/>
           </a:p>
@@ -1045,7 +1046,7 @@
             <a:fld id="{1D8BD707-D9CF-40AE-B4C6-C98DA3205C09}" type="datetimeFigureOut">
               <a:rPr lang="en-US" smtClean="0"/>
               <a:pPr/>
-              <a:t>3/13/2017</a:t>
+              <a:t>3/19/2017</a:t>
             </a:fld>
             <a:endParaRPr lang="en-US"/>
           </a:p>
@@ -1330,7 +1331,7 @@
             <a:fld id="{1D8BD707-D9CF-40AE-B4C6-C98DA3205C09}" type="datetimeFigureOut">
               <a:rPr lang="en-US" smtClean="0"/>
               <a:pPr/>
-              <a:t>3/13/2017</a:t>
+              <a:t>3/19/2017</a:t>
             </a:fld>
             <a:endParaRPr lang="en-US"/>
           </a:p>
@@ -1749,7 +1750,7 @@
             <a:fld id="{1D8BD707-D9CF-40AE-B4C6-C98DA3205C09}" type="datetimeFigureOut">
               <a:rPr lang="en-US" smtClean="0"/>
               <a:pPr/>
-              <a:t>3/13/2017</a:t>
+              <a:t>3/19/2017</a:t>
             </a:fld>
             <a:endParaRPr lang="en-US"/>
           </a:p>
@@ -1864,7 +1865,7 @@
             <a:fld id="{1D8BD707-D9CF-40AE-B4C6-C98DA3205C09}" type="datetimeFigureOut">
               <a:rPr lang="en-US" smtClean="0"/>
               <a:pPr/>
-              <a:t>3/13/2017</a:t>
+              <a:t>3/19/2017</a:t>
             </a:fld>
             <a:endParaRPr lang="en-US"/>
           </a:p>
@@ -1956,7 +1957,7 @@
             <a:fld id="{1D8BD707-D9CF-40AE-B4C6-C98DA3205C09}" type="datetimeFigureOut">
               <a:rPr lang="en-US" smtClean="0"/>
               <a:pPr/>
-              <a:t>3/13/2017</a:t>
+              <a:t>3/19/2017</a:t>
             </a:fld>
             <a:endParaRPr lang="en-US"/>
           </a:p>
@@ -2230,7 +2231,7 @@
             <a:fld id="{1D8BD707-D9CF-40AE-B4C6-C98DA3205C09}" type="datetimeFigureOut">
               <a:rPr lang="en-US" smtClean="0"/>
               <a:pPr/>
-              <a:t>3/13/2017</a:t>
+              <a:t>3/19/2017</a:t>
             </a:fld>
             <a:endParaRPr lang="en-US"/>
           </a:p>
@@ -2480,7 +2481,7 @@
             <a:fld id="{1D8BD707-D9CF-40AE-B4C6-C98DA3205C09}" type="datetimeFigureOut">
               <a:rPr lang="en-US" smtClean="0"/>
               <a:pPr/>
-              <a:t>3/13/2017</a:t>
+              <a:t>3/19/2017</a:t>
             </a:fld>
             <a:endParaRPr lang="en-US"/>
           </a:p>
@@ -2690,7 +2691,7 @@
             <a:fld id="{1D8BD707-D9CF-40AE-B4C6-C98DA3205C09}" type="datetimeFigureOut">
               <a:rPr lang="en-US" smtClean="0"/>
               <a:pPr/>
-              <a:t>3/13/2017</a:t>
+              <a:t>3/19/2017</a:t>
             </a:fld>
             <a:endParaRPr lang="en-US"/>
           </a:p>
@@ -3989,6 +3990,138 @@
     <p:extLst>
       <p:ext uri="{BB962C8B-B14F-4D97-AF65-F5344CB8AC3E}">
         <p14:creationId xmlns:p14="http://schemas.microsoft.com/office/powerpoint/2010/main" val="1033425590"/>
+      </p:ext>
+    </p:extLst>
+  </p:cSld>
+  <p:clrMapOvr>
+    <a:masterClrMapping/>
+  </p:clrMapOvr>
+</p:sld>
+</file>
+
+<file path=ppt/slides/slide4.xml><?xml version="1.0" encoding="utf-8"?>
+<p:sld xmlns:a="http://schemas.openxmlformats.org/drawingml/2006/main" xmlns:r="http://schemas.openxmlformats.org/officeDocument/2006/relationships" xmlns:p="http://schemas.openxmlformats.org/presentationml/2006/main">
+  <p:cSld>
+    <p:spTree>
+      <p:nvGrpSpPr>
+        <p:cNvPr id="1" name=""/>
+        <p:cNvGrpSpPr/>
+        <p:nvPr/>
+      </p:nvGrpSpPr>
+      <p:grpSpPr>
+        <a:xfrm>
+          <a:off x="0" y="0"/>
+          <a:ext cx="0" cy="0"/>
+          <a:chOff x="0" y="0"/>
+          <a:chExt cx="0" cy="0"/>
+        </a:xfrm>
+      </p:grpSpPr>
+      <p:pic>
+        <p:nvPicPr>
+          <p:cNvPr id="1029" name="Picture 5"/>
+          <p:cNvPicPr>
+            <a:picLocks noChangeAspect="1" noChangeArrowheads="1"/>
+          </p:cNvPicPr>
+          <p:nvPr/>
+        </p:nvPicPr>
+        <p:blipFill>
+          <a:blip r:embed="rId2">
+            <a:extLst>
+              <a:ext uri="{28A0092B-C50C-407E-A947-70E740481C1C}">
+                <a14:useLocalDpi xmlns:a14="http://schemas.microsoft.com/office/drawing/2010/main" val="0"/>
+              </a:ext>
+            </a:extLst>
+          </a:blip>
+          <a:srcRect/>
+          <a:stretch>
+            <a:fillRect/>
+          </a:stretch>
+        </p:blipFill>
+        <p:spPr bwMode="auto">
+          <a:xfrm>
+            <a:off x="76200" y="1143000"/>
+            <a:ext cx="8929688" cy="4020603"/>
+          </a:xfrm>
+          <a:prstGeom prst="rect">
+            <a:avLst/>
+          </a:prstGeom>
+          <a:noFill/>
+          <a:ln>
+            <a:noFill/>
+          </a:ln>
+          <a:extLst>
+            <a:ext uri="{909E8E84-426E-40DD-AFC4-6F175D3DCCD1}">
+              <a14:hiddenFill xmlns:a14="http://schemas.microsoft.com/office/drawing/2010/main">
+                <a:solidFill>
+                  <a:schemeClr val="accent1"/>
+                </a:solidFill>
+              </a14:hiddenFill>
+            </a:ext>
+            <a:ext uri="{91240B29-F687-4F45-9708-019B960494DF}">
+              <a14:hiddenLine xmlns:a14="http://schemas.microsoft.com/office/drawing/2010/main" w="9525">
+                <a:solidFill>
+                  <a:schemeClr val="tx1"/>
+                </a:solidFill>
+                <a:miter lim="800000"/>
+                <a:headEnd/>
+                <a:tailEnd/>
+              </a14:hiddenLine>
+            </a:ext>
+          </a:extLst>
+        </p:spPr>
+      </p:pic>
+      <p:sp>
+        <p:nvSpPr>
+          <p:cNvPr id="4" name="Right Arrow 3"/>
+          <p:cNvSpPr/>
+          <p:nvPr/>
+        </p:nvSpPr>
+        <p:spPr>
+          <a:xfrm>
+            <a:off x="7024688" y="1600200"/>
+            <a:ext cx="978408" cy="484632"/>
+          </a:xfrm>
+          <a:prstGeom prst="rightArrow">
+            <a:avLst/>
+          </a:prstGeom>
+          <a:solidFill>
+            <a:srgbClr val="FF0000"/>
+          </a:solidFill>
+          <a:ln>
+            <a:solidFill>
+              <a:srgbClr val="FF0000"/>
+            </a:solidFill>
+          </a:ln>
+        </p:spPr>
+        <p:style>
+          <a:lnRef idx="2">
+            <a:schemeClr val="accent1">
+              <a:shade val="50000"/>
+            </a:schemeClr>
+          </a:lnRef>
+          <a:fillRef idx="1">
+            <a:schemeClr val="accent1"/>
+          </a:fillRef>
+          <a:effectRef idx="0">
+            <a:schemeClr val="accent1"/>
+          </a:effectRef>
+          <a:fontRef idx="minor">
+            <a:schemeClr val="lt1"/>
+          </a:fontRef>
+        </p:style>
+        <p:txBody>
+          <a:bodyPr rtlCol="0" anchor="ctr"/>
+          <a:lstStyle/>
+          <a:p>
+            <a:pPr algn="ctr"/>
+            <a:endParaRPr lang="en-US"/>
+          </a:p>
+        </p:txBody>
+      </p:sp>
+    </p:spTree>
+    <p:extLst>
+      <p:ext uri="{BB962C8B-B14F-4D97-AF65-F5344CB8AC3E}">
+        <p14:creationId xmlns:p14="http://schemas.microsoft.com/office/powerpoint/2010/main" val="1135802590"/>
       </p:ext>
     </p:extLst>
   </p:cSld>

</xml_diff>